<commit_message>
changes to section 1 and 2
</commit_message>
<xml_diff>
--- a/frame_skipping.pptx
+++ b/frame_skipping.pptx
@@ -104,6 +104,11 @@
       </a:defRPr>
     </a:lvl9pPr>
   </p:defaultTextStyle>
+  <p:extLst>
+    <p:ext uri="{EFAFB233-063F-42B5-8137-9DF3F51BA10A}">
+      <p15:sldGuideLst xmlns:p15="http://schemas.microsoft.com/office/powerpoint/2012/main"/>
+    </p:ext>
+  </p:extLst>
 </p:presentation>
 </file>
 
@@ -256,7 +261,7 @@
           <a:p>
             <a:fld id="{40FF6A7D-9FFC-4859-B085-F471F02C5E56}" type="datetimeFigureOut">
               <a:rPr lang="en-GB" smtClean="0"/>
-              <a:t>13/04/2020</a:t>
+              <a:t>13/05/2020</a:t>
             </a:fld>
             <a:endParaRPr lang="en-GB"/>
           </a:p>
@@ -456,7 +461,7 @@
           <a:p>
             <a:fld id="{40FF6A7D-9FFC-4859-B085-F471F02C5E56}" type="datetimeFigureOut">
               <a:rPr lang="en-GB" smtClean="0"/>
-              <a:t>13/04/2020</a:t>
+              <a:t>13/05/2020</a:t>
             </a:fld>
             <a:endParaRPr lang="en-GB"/>
           </a:p>
@@ -666,7 +671,7 @@
           <a:p>
             <a:fld id="{40FF6A7D-9FFC-4859-B085-F471F02C5E56}" type="datetimeFigureOut">
               <a:rPr lang="en-GB" smtClean="0"/>
-              <a:t>13/04/2020</a:t>
+              <a:t>13/05/2020</a:t>
             </a:fld>
             <a:endParaRPr lang="en-GB"/>
           </a:p>
@@ -866,7 +871,7 @@
           <a:p>
             <a:fld id="{40FF6A7D-9FFC-4859-B085-F471F02C5E56}" type="datetimeFigureOut">
               <a:rPr lang="en-GB" smtClean="0"/>
-              <a:t>13/04/2020</a:t>
+              <a:t>13/05/2020</a:t>
             </a:fld>
             <a:endParaRPr lang="en-GB"/>
           </a:p>
@@ -1142,7 +1147,7 @@
           <a:p>
             <a:fld id="{40FF6A7D-9FFC-4859-B085-F471F02C5E56}" type="datetimeFigureOut">
               <a:rPr lang="en-GB" smtClean="0"/>
-              <a:t>13/04/2020</a:t>
+              <a:t>13/05/2020</a:t>
             </a:fld>
             <a:endParaRPr lang="en-GB"/>
           </a:p>
@@ -1410,7 +1415,7 @@
           <a:p>
             <a:fld id="{40FF6A7D-9FFC-4859-B085-F471F02C5E56}" type="datetimeFigureOut">
               <a:rPr lang="en-GB" smtClean="0"/>
-              <a:t>13/04/2020</a:t>
+              <a:t>13/05/2020</a:t>
             </a:fld>
             <a:endParaRPr lang="en-GB"/>
           </a:p>
@@ -1825,7 +1830,7 @@
           <a:p>
             <a:fld id="{40FF6A7D-9FFC-4859-B085-F471F02C5E56}" type="datetimeFigureOut">
               <a:rPr lang="en-GB" smtClean="0"/>
-              <a:t>13/04/2020</a:t>
+              <a:t>13/05/2020</a:t>
             </a:fld>
             <a:endParaRPr lang="en-GB"/>
           </a:p>
@@ -1967,7 +1972,7 @@
           <a:p>
             <a:fld id="{40FF6A7D-9FFC-4859-B085-F471F02C5E56}" type="datetimeFigureOut">
               <a:rPr lang="en-GB" smtClean="0"/>
-              <a:t>13/04/2020</a:t>
+              <a:t>13/05/2020</a:t>
             </a:fld>
             <a:endParaRPr lang="en-GB"/>
           </a:p>
@@ -2080,7 +2085,7 @@
           <a:p>
             <a:fld id="{40FF6A7D-9FFC-4859-B085-F471F02C5E56}" type="datetimeFigureOut">
               <a:rPr lang="en-GB" smtClean="0"/>
-              <a:t>13/04/2020</a:t>
+              <a:t>13/05/2020</a:t>
             </a:fld>
             <a:endParaRPr lang="en-GB"/>
           </a:p>
@@ -2393,7 +2398,7 @@
           <a:p>
             <a:fld id="{40FF6A7D-9FFC-4859-B085-F471F02C5E56}" type="datetimeFigureOut">
               <a:rPr lang="en-GB" smtClean="0"/>
-              <a:t>13/04/2020</a:t>
+              <a:t>13/05/2020</a:t>
             </a:fld>
             <a:endParaRPr lang="en-GB"/>
           </a:p>
@@ -2682,7 +2687,7 @@
           <a:p>
             <a:fld id="{40FF6A7D-9FFC-4859-B085-F471F02C5E56}" type="datetimeFigureOut">
               <a:rPr lang="en-GB" smtClean="0"/>
-              <a:t>13/04/2020</a:t>
+              <a:t>13/05/2020</a:t>
             </a:fld>
             <a:endParaRPr lang="en-GB"/>
           </a:p>
@@ -2925,7 +2930,7 @@
           <a:p>
             <a:fld id="{40FF6A7D-9FFC-4859-B085-F471F02C5E56}" type="datetimeFigureOut">
               <a:rPr lang="en-GB" smtClean="0"/>
-              <a:t>13/04/2020</a:t>
+              <a:t>13/05/2020</a:t>
             </a:fld>
             <a:endParaRPr lang="en-GB"/>
           </a:p>
@@ -3412,6 +3417,11 @@
           <a:prstGeom prst="rect">
             <a:avLst/>
           </a:prstGeom>
+          <a:ln>
+            <a:solidFill>
+              <a:schemeClr val="tx1"/>
+            </a:solidFill>
+          </a:ln>
         </p:spPr>
       </p:pic>
       <p:pic>
@@ -3448,6 +3458,11 @@
           <a:prstGeom prst="rect">
             <a:avLst/>
           </a:prstGeom>
+          <a:ln>
+            <a:solidFill>
+              <a:schemeClr val="tx1"/>
+            </a:solidFill>
+          </a:ln>
         </p:spPr>
       </p:pic>
       <p:cxnSp>
@@ -3694,6 +3709,11 @@
           <a:prstGeom prst="rect">
             <a:avLst/>
           </a:prstGeom>
+          <a:ln>
+            <a:solidFill>
+              <a:schemeClr val="tx1"/>
+            </a:solidFill>
+          </a:ln>
         </p:spPr>
       </p:pic>
       <p:pic>
@@ -3731,6 +3751,11 @@
           <a:prstGeom prst="rect">
             <a:avLst/>
           </a:prstGeom>
+          <a:ln>
+            <a:solidFill>
+              <a:schemeClr val="tx1"/>
+            </a:solidFill>
+          </a:ln>
         </p:spPr>
       </p:pic>
       <p:sp>

</xml_diff>